<commit_message>
Update the readme document
</commit_message>
<xml_diff>
--- a/6. Develop AI solutions with Azure OpenAI/Develop AI solutions with Azure OpenAI.pptx
+++ b/6. Develop AI solutions with Azure OpenAI/Develop AI solutions with Azure OpenAI.pptx
@@ -235,7 +235,7 @@
           <a:p>
             <a:fld id="{B56F32FC-4BD9-442A-A8C6-51598C909FE3}" type="datetimeFigureOut">
               <a:rPr lang="en-US" smtClean="0"/>
-              <a:t>5/12/2023</a:t>
+              <a:t>5/13/2023</a:t>
             </a:fld>
             <a:endParaRPr lang="en-US" dirty="0"/>
           </a:p>
@@ -412,7 +412,7 @@
           <a:p>
             <a:fld id="{056371FA-A98D-41E8-93F4-09945841298A}" type="datetimeFigureOut">
               <a:rPr lang="en-US" smtClean="0"/>
-              <a:t>5/12/2023</a:t>
+              <a:t>5/13/2023</a:t>
             </a:fld>
             <a:endParaRPr lang="en-US" dirty="0"/>
           </a:p>
@@ -18160,15 +18160,6 @@
 </file>
 
 <file path=customXml/item1.xml><?xml version="1.0" encoding="utf-8"?>
-<?mso-contentType ?>
-<FormTemplates xmlns="http://schemas.microsoft.com/sharepoint/v3/contenttype/forms">
-  <Display>DocumentLibraryForm</Display>
-  <Edit>DocumentLibraryForm</Edit>
-  <New>DocumentLibraryForm</New>
-</FormTemplates>
-</file>
-
-<file path=customXml/item2.xml><?xml version="1.0" encoding="utf-8"?>
 <ct:contentTypeSchema xmlns:ct="http://schemas.microsoft.com/office/2006/metadata/contentType" xmlns:ma="http://schemas.microsoft.com/office/2006/metadata/properties/metaAttributes" ct:_="" ma:_="" ma:contentTypeName="Document" ma:contentTypeID="0x01010079F111ED35F8CC479449609E8A0923A6" ma:contentTypeVersion="20" ma:contentTypeDescription="Create a new document." ma:contentTypeScope="" ma:versionID="1267097ee5f5874adfcc408041ae252e">
   <xsd:schema xmlns:xsd="http://www.w3.org/2001/XMLSchema" xmlns:xs="http://www.w3.org/2001/XMLSchema" xmlns:p="http://schemas.microsoft.com/office/2006/metadata/properties" xmlns:ns1="http://schemas.microsoft.com/sharepoint/v3" xmlns:ns2="71af3243-3dd4-4a8d-8c0d-dd76da1f02a5" xmlns:ns3="16c05727-aa75-4e4a-9b5f-8a80a1165891" xmlns:ns4="230e9df3-be65-4c73-a93b-d1236ebd677e" targetNamespace="http://schemas.microsoft.com/office/2006/metadata/properties" ma:root="true" ma:fieldsID="395891a93df65b14727750f2c06c306c" ns1:_="" ns2:_="" ns3:_="" ns4:_="">
     <xsd:import namespace="http://schemas.microsoft.com/sharepoint/v3"/>
@@ -18444,6 +18435,15 @@
 </ct:contentTypeSchema>
 </file>
 
+<file path=customXml/item2.xml><?xml version="1.0" encoding="utf-8"?>
+<?mso-contentType ?>
+<FormTemplates xmlns="http://schemas.microsoft.com/sharepoint/v3/contenttype/forms">
+  <Display>DocumentLibraryForm</Display>
+  <Edit>DocumentLibraryForm</Edit>
+  <New>DocumentLibraryForm</New>
+</FormTemplates>
+</file>
+
 <file path=customXml/item3.xml><?xml version="1.0" encoding="utf-8"?>
 <p:properties xmlns:p="http://schemas.microsoft.com/office/2006/metadata/properties" xmlns:xsi="http://www.w3.org/2001/XMLSchema-instance" xmlns:pc="http://schemas.microsoft.com/office/infopath/2007/PartnerControls">
   <documentManagement>
@@ -18464,14 +18464,6 @@
 </file>
 
 <file path=customXml/itemProps1.xml><?xml version="1.0" encoding="utf-8"?>
-<ds:datastoreItem xmlns:ds="http://schemas.openxmlformats.org/officeDocument/2006/customXml" ds:itemID="{BD5826B4-4DD2-4A9B-8D6D-E91CF9C2316C}">
-  <ds:schemaRefs>
-    <ds:schemaRef ds:uri="http://schemas.microsoft.com/sharepoint/v3/contenttype/forms"/>
-  </ds:schemaRefs>
-</ds:datastoreItem>
-</file>
-
-<file path=customXml/itemProps2.xml><?xml version="1.0" encoding="utf-8"?>
 <ds:datastoreItem xmlns:ds="http://schemas.openxmlformats.org/officeDocument/2006/customXml" ds:itemID="{4DC6F004-8F9D-4F40-8394-6C4C67F70915}">
   <ds:schemaRefs>
     <ds:schemaRef ds:uri="http://schemas.microsoft.com/office/2006/metadata/contentType"/>
@@ -18488,6 +18480,14 @@
     <ds:schemaRef ds:uri="http://purl.org/dc/elements/1.1/"/>
     <ds:schemaRef ds:uri="http://purl.org/dc/terms/"/>
     <ds:schemaRef ds:uri="http://schemas.microsoft.com/internal/obd"/>
+  </ds:schemaRefs>
+</ds:datastoreItem>
+</file>
+
+<file path=customXml/itemProps2.xml><?xml version="1.0" encoding="utf-8"?>
+<ds:datastoreItem xmlns:ds="http://schemas.openxmlformats.org/officeDocument/2006/customXml" ds:itemID="{BD5826B4-4DD2-4A9B-8D6D-E91CF9C2316C}">
+  <ds:schemaRefs>
+    <ds:schemaRef ds:uri="http://schemas.microsoft.com/sharepoint/v3/contenttype/forms"/>
   </ds:schemaRefs>
 </ds:datastoreItem>
 </file>

</xml_diff>

<commit_message>
update the nlp lab instructions
</commit_message>
<xml_diff>
--- a/6. Develop AI solutions with Azure OpenAI/Develop AI solutions with Azure OpenAI.pptx
+++ b/6. Develop AI solutions with Azure OpenAI/Develop AI solutions with Azure OpenAI.pptx
@@ -239,7 +239,7 @@
           <a:p>
             <a:fld id="{B56F32FC-4BD9-442A-A8C6-51598C909FE3}" type="datetimeFigureOut">
               <a:rPr lang="en-US" smtClean="0"/>
-              <a:t>5/15/2023</a:t>
+              <a:t>5/18/2023</a:t>
             </a:fld>
             <a:endParaRPr lang="en-US" dirty="0"/>
           </a:p>
@@ -416,7 +416,7 @@
           <a:p>
             <a:fld id="{056371FA-A98D-41E8-93F4-09945841298A}" type="datetimeFigureOut">
               <a:rPr lang="en-US" smtClean="0"/>
-              <a:t>5/15/2023</a:t>
+              <a:t>5/18/2023</a:t>
             </a:fld>
             <a:endParaRPr lang="en-US" dirty="0"/>
           </a:p>
@@ -20225,15 +20225,6 @@
 </file>
 
 <file path=customXml/item1.xml><?xml version="1.0" encoding="utf-8"?>
-<?mso-contentType ?>
-<FormTemplates xmlns="http://schemas.microsoft.com/sharepoint/v3/contenttype/forms">
-  <Display>DocumentLibraryForm</Display>
-  <Edit>DocumentLibraryForm</Edit>
-  <New>DocumentLibraryForm</New>
-</FormTemplates>
-</file>
-
-<file path=customXml/item2.xml><?xml version="1.0" encoding="utf-8"?>
 <ct:contentTypeSchema xmlns:ct="http://schemas.microsoft.com/office/2006/metadata/contentType" xmlns:ma="http://schemas.microsoft.com/office/2006/metadata/properties/metaAttributes" ct:_="" ma:_="" ma:contentTypeName="Document" ma:contentTypeID="0x01010079F111ED35F8CC479449609E8A0923A6" ma:contentTypeVersion="20" ma:contentTypeDescription="Create a new document." ma:contentTypeScope="" ma:versionID="1267097ee5f5874adfcc408041ae252e">
   <xsd:schema xmlns:xsd="http://www.w3.org/2001/XMLSchema" xmlns:xs="http://www.w3.org/2001/XMLSchema" xmlns:p="http://schemas.microsoft.com/office/2006/metadata/properties" xmlns:ns1="http://schemas.microsoft.com/sharepoint/v3" xmlns:ns2="71af3243-3dd4-4a8d-8c0d-dd76da1f02a5" xmlns:ns3="16c05727-aa75-4e4a-9b5f-8a80a1165891" xmlns:ns4="230e9df3-be65-4c73-a93b-d1236ebd677e" targetNamespace="http://schemas.microsoft.com/office/2006/metadata/properties" ma:root="true" ma:fieldsID="395891a93df65b14727750f2c06c306c" ns1:_="" ns2:_="" ns3:_="" ns4:_="">
     <xsd:import namespace="http://schemas.microsoft.com/sharepoint/v3"/>
@@ -20509,6 +20500,15 @@
 </ct:contentTypeSchema>
 </file>
 
+<file path=customXml/item2.xml><?xml version="1.0" encoding="utf-8"?>
+<?mso-contentType ?>
+<FormTemplates xmlns="http://schemas.microsoft.com/sharepoint/v3/contenttype/forms">
+  <Display>DocumentLibraryForm</Display>
+  <Edit>DocumentLibraryForm</Edit>
+  <New>DocumentLibraryForm</New>
+</FormTemplates>
+</file>
+
 <file path=customXml/item3.xml><?xml version="1.0" encoding="utf-8"?>
 <p:properties xmlns:p="http://schemas.microsoft.com/office/2006/metadata/properties" xmlns:xsi="http://www.w3.org/2001/XMLSchema-instance" xmlns:pc="http://schemas.microsoft.com/office/infopath/2007/PartnerControls">
   <documentManagement>
@@ -20529,14 +20529,6 @@
 </file>
 
 <file path=customXml/itemProps1.xml><?xml version="1.0" encoding="utf-8"?>
-<ds:datastoreItem xmlns:ds="http://schemas.openxmlformats.org/officeDocument/2006/customXml" ds:itemID="{BD5826B4-4DD2-4A9B-8D6D-E91CF9C2316C}">
-  <ds:schemaRefs>
-    <ds:schemaRef ds:uri="http://schemas.microsoft.com/sharepoint/v3/contenttype/forms"/>
-  </ds:schemaRefs>
-</ds:datastoreItem>
-</file>
-
-<file path=customXml/itemProps2.xml><?xml version="1.0" encoding="utf-8"?>
 <ds:datastoreItem xmlns:ds="http://schemas.openxmlformats.org/officeDocument/2006/customXml" ds:itemID="{4DC6F004-8F9D-4F40-8394-6C4C67F70915}">
   <ds:schemaRefs>
     <ds:schemaRef ds:uri="http://schemas.microsoft.com/office/2006/metadata/contentType"/>
@@ -20553,6 +20545,14 @@
     <ds:schemaRef ds:uri="http://purl.org/dc/elements/1.1/"/>
     <ds:schemaRef ds:uri="http://purl.org/dc/terms/"/>
     <ds:schemaRef ds:uri="http://schemas.microsoft.com/internal/obd"/>
+  </ds:schemaRefs>
+</ds:datastoreItem>
+</file>
+
+<file path=customXml/itemProps2.xml><?xml version="1.0" encoding="utf-8"?>
+<ds:datastoreItem xmlns:ds="http://schemas.openxmlformats.org/officeDocument/2006/customXml" ds:itemID="{BD5826B4-4DD2-4A9B-8D6D-E91CF9C2316C}">
+  <ds:schemaRefs>
+    <ds:schemaRef ds:uri="http://schemas.microsoft.com/sharepoint/v3/contenttype/forms"/>
   </ds:schemaRefs>
 </ds:datastoreItem>
 </file>

</xml_diff>